<commit_message>
update repo (add script and time series plots)
</commit_message>
<xml_diff>
--- a/results_comparison_PCRGLOB_DPL-HBV.pptx
+++ b/results_comparison_PCRGLOB_DPL-HBV.pptx
@@ -16,6 +16,8 @@
     <p:sldId id="262" r:id="rId10"/>
     <p:sldId id="263" r:id="rId11"/>
     <p:sldId id="264" r:id="rId12"/>
+    <p:sldId id="267" r:id="rId13"/>
+    <p:sldId id="268" r:id="rId14"/>
   </p:sldIdLst>
   <p:sldSz cx="12192000" cy="6858000"/>
   <p:notesSz cx="6858000" cy="9144000"/>
@@ -269,7 +271,7 @@
           <a:p>
             <a:fld id="{38F8A17B-FC6F-4F04-B5BD-6354CAEB8C4C}" type="datetimeFigureOut">
               <a:rPr lang="en-US" smtClean="0"/>
-              <a:t>4/25/2024</a:t>
+              <a:t>4/26/2024</a:t>
             </a:fld>
             <a:endParaRPr lang="en-US"/>
           </a:p>
@@ -467,7 +469,7 @@
           <a:p>
             <a:fld id="{38F8A17B-FC6F-4F04-B5BD-6354CAEB8C4C}" type="datetimeFigureOut">
               <a:rPr lang="en-US" smtClean="0"/>
-              <a:t>4/25/2024</a:t>
+              <a:t>4/26/2024</a:t>
             </a:fld>
             <a:endParaRPr lang="en-US"/>
           </a:p>
@@ -675,7 +677,7 @@
           <a:p>
             <a:fld id="{38F8A17B-FC6F-4F04-B5BD-6354CAEB8C4C}" type="datetimeFigureOut">
               <a:rPr lang="en-US" smtClean="0"/>
-              <a:t>4/25/2024</a:t>
+              <a:t>4/26/2024</a:t>
             </a:fld>
             <a:endParaRPr lang="en-US"/>
           </a:p>
@@ -873,7 +875,7 @@
           <a:p>
             <a:fld id="{38F8A17B-FC6F-4F04-B5BD-6354CAEB8C4C}" type="datetimeFigureOut">
               <a:rPr lang="en-US" smtClean="0"/>
-              <a:t>4/25/2024</a:t>
+              <a:t>4/26/2024</a:t>
             </a:fld>
             <a:endParaRPr lang="en-US"/>
           </a:p>
@@ -1148,7 +1150,7 @@
           <a:p>
             <a:fld id="{38F8A17B-FC6F-4F04-B5BD-6354CAEB8C4C}" type="datetimeFigureOut">
               <a:rPr lang="en-US" smtClean="0"/>
-              <a:t>4/25/2024</a:t>
+              <a:t>4/26/2024</a:t>
             </a:fld>
             <a:endParaRPr lang="en-US"/>
           </a:p>
@@ -1413,7 +1415,7 @@
           <a:p>
             <a:fld id="{38F8A17B-FC6F-4F04-B5BD-6354CAEB8C4C}" type="datetimeFigureOut">
               <a:rPr lang="en-US" smtClean="0"/>
-              <a:t>4/25/2024</a:t>
+              <a:t>4/26/2024</a:t>
             </a:fld>
             <a:endParaRPr lang="en-US"/>
           </a:p>
@@ -1825,7 +1827,7 @@
           <a:p>
             <a:fld id="{38F8A17B-FC6F-4F04-B5BD-6354CAEB8C4C}" type="datetimeFigureOut">
               <a:rPr lang="en-US" smtClean="0"/>
-              <a:t>4/25/2024</a:t>
+              <a:t>4/26/2024</a:t>
             </a:fld>
             <a:endParaRPr lang="en-US"/>
           </a:p>
@@ -1966,7 +1968,7 @@
           <a:p>
             <a:fld id="{38F8A17B-FC6F-4F04-B5BD-6354CAEB8C4C}" type="datetimeFigureOut">
               <a:rPr lang="en-US" smtClean="0"/>
-              <a:t>4/25/2024</a:t>
+              <a:t>4/26/2024</a:t>
             </a:fld>
             <a:endParaRPr lang="en-US"/>
           </a:p>
@@ -2079,7 +2081,7 @@
           <a:p>
             <a:fld id="{38F8A17B-FC6F-4F04-B5BD-6354CAEB8C4C}" type="datetimeFigureOut">
               <a:rPr lang="en-US" smtClean="0"/>
-              <a:t>4/25/2024</a:t>
+              <a:t>4/26/2024</a:t>
             </a:fld>
             <a:endParaRPr lang="en-US"/>
           </a:p>
@@ -2390,7 +2392,7 @@
           <a:p>
             <a:fld id="{38F8A17B-FC6F-4F04-B5BD-6354CAEB8C4C}" type="datetimeFigureOut">
               <a:rPr lang="en-US" smtClean="0"/>
-              <a:t>4/25/2024</a:t>
+              <a:t>4/26/2024</a:t>
             </a:fld>
             <a:endParaRPr lang="en-US"/>
           </a:p>
@@ -2678,7 +2680,7 @@
           <a:p>
             <a:fld id="{38F8A17B-FC6F-4F04-B5BD-6354CAEB8C4C}" type="datetimeFigureOut">
               <a:rPr lang="en-US" smtClean="0"/>
-              <a:t>4/25/2024</a:t>
+              <a:t>4/26/2024</a:t>
             </a:fld>
             <a:endParaRPr lang="en-US"/>
           </a:p>
@@ -2919,7 +2921,7 @@
           <a:p>
             <a:fld id="{38F8A17B-FC6F-4F04-B5BD-6354CAEB8C4C}" type="datetimeFigureOut">
               <a:rPr lang="en-US" smtClean="0"/>
-              <a:t>4/25/2024</a:t>
+              <a:t>4/26/2024</a:t>
             </a:fld>
             <a:endParaRPr lang="en-US"/>
           </a:p>
@@ -3357,7 +3359,10 @@
           <a:bodyPr/>
           <a:lstStyle/>
           <a:p>
-            <a:endParaRPr lang="en-US"/>
+            <a:r>
+              <a:rPr lang="en-US" dirty="0"/>
+              <a:t>Comparison between PCR-GLOBWB 2.0 and DPL-HBV</a:t>
+            </a:r>
           </a:p>
         </p:txBody>
       </p:sp>
@@ -3382,7 +3387,10 @@
           <a:bodyPr/>
           <a:lstStyle/>
           <a:p>
-            <a:endParaRPr lang="en-US"/>
+            <a:r>
+              <a:rPr lang="en-US" dirty="0"/>
+              <a:t>04/26/2024</a:t>
+            </a:r>
           </a:p>
         </p:txBody>
       </p:sp>
@@ -3592,6 +3600,268 @@
     <p:extLst>
       <p:ext uri="{BB962C8B-B14F-4D97-AF65-F5344CB8AC3E}">
         <p14:creationId xmlns:p14="http://schemas.microsoft.com/office/powerpoint/2010/main" val="1403525426"/>
+      </p:ext>
+    </p:extLst>
+  </p:cSld>
+  <p:clrMapOvr>
+    <a:masterClrMapping/>
+  </p:clrMapOvr>
+</p:sld>
+</file>
+
+<file path=ppt/slides/slide12.xml><?xml version="1.0" encoding="utf-8"?>
+<p:sld xmlns:a="http://schemas.openxmlformats.org/drawingml/2006/main" xmlns:r="http://schemas.openxmlformats.org/officeDocument/2006/relationships" xmlns:p="http://schemas.openxmlformats.org/presentationml/2006/main">
+  <p:cSld>
+    <p:spTree>
+      <p:nvGrpSpPr>
+        <p:cNvPr id="1" name=""/>
+        <p:cNvGrpSpPr/>
+        <p:nvPr/>
+      </p:nvGrpSpPr>
+      <p:grpSpPr>
+        <a:xfrm>
+          <a:off x="0" y="0"/>
+          <a:ext cx="0" cy="0"/>
+          <a:chOff x="0" y="0"/>
+          <a:chExt cx="0" cy="0"/>
+        </a:xfrm>
+      </p:grpSpPr>
+      <p:sp>
+        <p:nvSpPr>
+          <p:cNvPr id="2" name="Title 1">
+            <a:extLst>
+              <a:ext uri="{FF2B5EF4-FFF2-40B4-BE49-F238E27FC236}">
+                <a16:creationId xmlns:a16="http://schemas.microsoft.com/office/drawing/2014/main" id="{2B139A36-0DE4-D522-7B46-4B8641BA964A}"/>
+              </a:ext>
+            </a:extLst>
+          </p:cNvPr>
+          <p:cNvSpPr>
+            <a:spLocks noGrp="1"/>
+          </p:cNvSpPr>
+          <p:nvPr>
+            <p:ph type="title"/>
+          </p:nvPr>
+        </p:nvSpPr>
+        <p:spPr/>
+        <p:txBody>
+          <a:bodyPr/>
+          <a:lstStyle/>
+          <a:p>
+            <a:endParaRPr lang="en-US"/>
+          </a:p>
+        </p:txBody>
+      </p:sp>
+      <p:sp>
+        <p:nvSpPr>
+          <p:cNvPr id="3" name="Content Placeholder 2">
+            <a:extLst>
+              <a:ext uri="{FF2B5EF4-FFF2-40B4-BE49-F238E27FC236}">
+                <a16:creationId xmlns:a16="http://schemas.microsoft.com/office/drawing/2014/main" id="{2885AA1C-C55F-68F0-6E26-7AF3736B32A5}"/>
+              </a:ext>
+            </a:extLst>
+          </p:cNvPr>
+          <p:cNvSpPr>
+            <a:spLocks noGrp="1"/>
+          </p:cNvSpPr>
+          <p:nvPr>
+            <p:ph idx="1"/>
+          </p:nvPr>
+        </p:nvSpPr>
+        <p:spPr/>
+        <p:txBody>
+          <a:bodyPr/>
+          <a:lstStyle/>
+          <a:p>
+            <a:r>
+              <a:rPr lang="en-US" dirty="0"/>
+              <a:t>Good to have headwater catchment.</a:t>
+            </a:r>
+          </a:p>
+          <a:p>
+            <a:r>
+              <a:rPr lang="en-US" dirty="0"/>
+              <a:t>Need larger catchments</a:t>
+            </a:r>
+          </a:p>
+          <a:p>
+            <a:r>
+              <a:rPr lang="en-US" dirty="0"/>
+              <a:t>Using RG – look at headwater and downstream catchments.</a:t>
+            </a:r>
+          </a:p>
+          <a:p>
+            <a:r>
+              <a:rPr lang="en-US" dirty="0"/>
+              <a:t>Need to show risk. Calculate a drought metric – recurrence intervals</a:t>
+            </a:r>
+          </a:p>
+          <a:p>
+            <a:r>
+              <a:rPr lang="en-US" dirty="0"/>
+              <a:t>Cumulative low flow</a:t>
+            </a:r>
+          </a:p>
+          <a:p>
+            <a:endParaRPr lang="en-US" dirty="0"/>
+          </a:p>
+          <a:p>
+            <a:endParaRPr lang="en-US" dirty="0"/>
+          </a:p>
+        </p:txBody>
+      </p:sp>
+    </p:spTree>
+    <p:extLst>
+      <p:ext uri="{BB962C8B-B14F-4D97-AF65-F5344CB8AC3E}">
+        <p14:creationId xmlns:p14="http://schemas.microsoft.com/office/powerpoint/2010/main" val="3618782957"/>
+      </p:ext>
+    </p:extLst>
+  </p:cSld>
+  <p:clrMapOvr>
+    <a:masterClrMapping/>
+  </p:clrMapOvr>
+</p:sld>
+</file>
+
+<file path=ppt/slides/slide13.xml><?xml version="1.0" encoding="utf-8"?>
+<p:sld xmlns:a="http://schemas.openxmlformats.org/drawingml/2006/main" xmlns:r="http://schemas.openxmlformats.org/officeDocument/2006/relationships" xmlns:p="http://schemas.openxmlformats.org/presentationml/2006/main">
+  <p:cSld>
+    <p:spTree>
+      <p:nvGrpSpPr>
+        <p:cNvPr id="1" name=""/>
+        <p:cNvGrpSpPr/>
+        <p:nvPr/>
+      </p:nvGrpSpPr>
+      <p:grpSpPr>
+        <a:xfrm>
+          <a:off x="0" y="0"/>
+          <a:ext cx="0" cy="0"/>
+          <a:chOff x="0" y="0"/>
+          <a:chExt cx="0" cy="0"/>
+        </a:xfrm>
+      </p:grpSpPr>
+      <p:sp>
+        <p:nvSpPr>
+          <p:cNvPr id="2" name="Title 1">
+            <a:extLst>
+              <a:ext uri="{FF2B5EF4-FFF2-40B4-BE49-F238E27FC236}">
+                <a16:creationId xmlns:a16="http://schemas.microsoft.com/office/drawing/2014/main" id="{29750893-E8D1-39B4-8524-70A5C05037AE}"/>
+              </a:ext>
+            </a:extLst>
+          </p:cNvPr>
+          <p:cNvSpPr>
+            <a:spLocks noGrp="1"/>
+          </p:cNvSpPr>
+          <p:nvPr>
+            <p:ph type="title"/>
+          </p:nvPr>
+        </p:nvSpPr>
+        <p:spPr/>
+        <p:txBody>
+          <a:bodyPr/>
+          <a:lstStyle/>
+          <a:p>
+            <a:endParaRPr lang="en-US" dirty="0"/>
+          </a:p>
+        </p:txBody>
+      </p:sp>
+      <p:sp>
+        <p:nvSpPr>
+          <p:cNvPr id="3" name="Content Placeholder 2">
+            <a:extLst>
+              <a:ext uri="{FF2B5EF4-FFF2-40B4-BE49-F238E27FC236}">
+                <a16:creationId xmlns:a16="http://schemas.microsoft.com/office/drawing/2014/main" id="{D316E108-E07D-4AC9-8AF9-15AE4563E02C}"/>
+              </a:ext>
+            </a:extLst>
+          </p:cNvPr>
+          <p:cNvSpPr>
+            <a:spLocks noGrp="1"/>
+          </p:cNvSpPr>
+          <p:nvPr>
+            <p:ph idx="1"/>
+          </p:nvPr>
+        </p:nvSpPr>
+        <p:spPr/>
+        <p:txBody>
+          <a:bodyPr/>
+          <a:lstStyle/>
+          <a:p>
+            <a:r>
+              <a:rPr lang="en-US" dirty="0"/>
+              <a:t>Add USGS gages across US and evaluate PCR over </a:t>
+            </a:r>
+            <a:r>
+              <a:rPr lang="en-US" dirty="0" err="1"/>
+              <a:t>caravan+USGS</a:t>
+            </a:r>
+            <a:endParaRPr lang="en-US" dirty="0"/>
+          </a:p>
+          <a:p>
+            <a:r>
+              <a:rPr lang="en-US" dirty="0"/>
+              <a:t>Fix the selection issues for PCR (looking at neighbors gages or river network data)</a:t>
+            </a:r>
+          </a:p>
+          <a:p>
+            <a:r>
+              <a:rPr lang="en-US" dirty="0"/>
+              <a:t>Take on RGB Futures (</a:t>
+            </a:r>
+            <a:r>
+              <a:rPr lang="en-US" dirty="0" err="1"/>
+              <a:t>Chinedum’s</a:t>
+            </a:r>
+            <a:r>
+              <a:rPr lang="en-US" dirty="0"/>
+              <a:t> version).</a:t>
+            </a:r>
+          </a:p>
+          <a:p>
+            <a:r>
+              <a:rPr lang="en-US" dirty="0"/>
+              <a:t>Use LSTM (w/ transfer learning) model over  RG basins</a:t>
+            </a:r>
+          </a:p>
+          <a:p>
+            <a:r>
+              <a:rPr lang="en-US" dirty="0"/>
+              <a:t>Try to get simulated reservoir storage from PCR.</a:t>
+            </a:r>
+          </a:p>
+        </p:txBody>
+      </p:sp>
+      <p:pic>
+        <p:nvPicPr>
+          <p:cNvPr id="5" name="Picture 4">
+            <a:extLst>
+              <a:ext uri="{FF2B5EF4-FFF2-40B4-BE49-F238E27FC236}">
+                <a16:creationId xmlns:a16="http://schemas.microsoft.com/office/drawing/2014/main" id="{403B727D-3F46-1A45-9CDB-AA3BC205B15E}"/>
+              </a:ext>
+            </a:extLst>
+          </p:cNvPr>
+          <p:cNvPicPr>
+            <a:picLocks noChangeAspect="1"/>
+          </p:cNvPicPr>
+          <p:nvPr/>
+        </p:nvPicPr>
+        <p:blipFill rotWithShape="1">
+          <a:blip r:embed="rId2"/>
+          <a:srcRect l="12500" t="23111" r="66500" b="50000"/>
+          <a:stretch/>
+        </p:blipFill>
+        <p:spPr>
+          <a:xfrm>
+            <a:off x="838200" y="1574165"/>
+            <a:ext cx="10515600" cy="3786868"/>
+          </a:xfrm>
+          <a:prstGeom prst="rect">
+            <a:avLst/>
+          </a:prstGeom>
+        </p:spPr>
+      </p:pic>
+    </p:spTree>
+    <p:extLst>
+      <p:ext uri="{BB962C8B-B14F-4D97-AF65-F5344CB8AC3E}">
+        <p14:creationId xmlns:p14="http://schemas.microsoft.com/office/powerpoint/2010/main" val="647339654"/>
       </p:ext>
     </p:extLst>
   </p:cSld>

</xml_diff>